<commit_message>
Chart service with fake data for the time being.
</commit_message>
<xml_diff>
--- a/presentation/presentation.pptx
+++ b/presentation/presentation.pptx
@@ -3039,7 +3039,34 @@
                 </a:solidFill>
                 <a:latin typeface="Source Sans Pro Black"/>
               </a:rPr>
-              <a:t>Click to edit the title text format</a:t>
+              <a:t>Click to </a:t>
+            </a:r>
+            <a:r>
+              <a:rPr b="1" lang="en-US" sz="3200" spc="-1" strike="noStrike">
+                <a:solidFill>
+                  <a:srgbClr val="ffffff"/>
+                </a:solidFill>
+                <a:latin typeface="Source Sans Pro Black"/>
+              </a:rPr>
+              <a:t>edit the </a:t>
+            </a:r>
+            <a:r>
+              <a:rPr b="1" lang="en-US" sz="3200" spc="-1" strike="noStrike">
+                <a:solidFill>
+                  <a:srgbClr val="ffffff"/>
+                </a:solidFill>
+                <a:latin typeface="Source Sans Pro Black"/>
+              </a:rPr>
+              <a:t>title text </a:t>
+            </a:r>
+            <a:r>
+              <a:rPr b="1" lang="en-US" sz="3200" spc="-1" strike="noStrike">
+                <a:solidFill>
+                  <a:srgbClr val="ffffff"/>
+                </a:solidFill>
+                <a:latin typeface="Source Sans Pro Black"/>
+              </a:rPr>
+              <a:t>format</a:t>
             </a:r>
             <a:endParaRPr b="1" lang="en-US" sz="3200" spc="-1" strike="noStrike">
               <a:solidFill>
@@ -3334,7 +3361,7 @@
           <a:bodyPr lIns="0" rIns="0" tIns="0" bIns="0" anchor="ctr"/>
           <a:p>
             <a:pPr algn="ctr"/>
-            <a:fld id="{D67E6FB1-2D6F-4577-AAF6-D3F855E6761C}" type="slidenum">
+            <a:fld id="{A85494D8-7204-462B-8C36-C0BF3A429FDC}" type="slidenum">
               <a:rPr b="1" lang="en-US" sz="1800" spc="-1" strike="noStrike">
                 <a:solidFill>
                   <a:srgbClr val="ffffff"/>
@@ -3710,7 +3737,7 @@
                 </a:solidFill>
                 <a:latin typeface="Source Sans Pro Black"/>
               </a:rPr>
-              <a:t>&lt;date/time&gt;</a:t>
+              <a:t> </a:t>
             </a:r>
             <a:endParaRPr b="1" lang="en-US" sz="1800" spc="-1" strike="noStrike">
               <a:solidFill>
@@ -3751,7 +3778,7 @@
                 </a:solidFill>
                 <a:latin typeface="Source Sans Pro Black"/>
               </a:rPr>
-              <a:t>&lt;footer&gt;</a:t>
+              <a:t> </a:t>
             </a:r>
             <a:endParaRPr b="1" lang="en-US" sz="1800" spc="-1" strike="noStrike">
               <a:solidFill>
@@ -3785,14 +3812,14 @@
           <a:bodyPr lIns="0" rIns="0" tIns="0" bIns="0"/>
           <a:p>
             <a:pPr algn="r"/>
-            <a:fld id="{C971577C-5342-4D1C-9EBB-5464FF260752}" type="slidenum">
+            <a:fld id="{11065637-5DA3-4D27-B83B-0B2392D1F967}" type="slidenum">
               <a:rPr b="1" lang="en-US" sz="1800" spc="-1" strike="noStrike">
                 <a:solidFill>
                   <a:srgbClr val="e74c3c"/>
                 </a:solidFill>
                 <a:latin typeface="Source Sans Pro Black"/>
               </a:rPr>
-              <a:t>&lt;number&gt;</a:t>
+              <a:t>1</a:t>
             </a:fld>
             <a:endParaRPr b="1" lang="en-US" sz="1800" spc="-1" strike="noStrike">
               <a:solidFill>
@@ -3928,16 +3955,7 @@
                 </a:solidFill>
                 <a:latin typeface="Source Sans Pro Light"/>
               </a:rPr>
-              <a:t> </a:t>
-            </a:r>
-            <a:r>
-              <a:rPr b="0" lang="en-US" sz="2200" spc="-1" strike="noStrike">
-                <a:solidFill>
-                  <a:srgbClr val="1c1c1c"/>
-                </a:solidFill>
-                <a:latin typeface="Source Sans Pro Light"/>
-              </a:rPr>
-              <a:t>and </a:t>
+              <a:t> and </a:t>
             </a:r>
             <a:r>
               <a:rPr b="0" lang="en-US" sz="2200" spc="-1" strike="noStrike" u="sng">
@@ -3947,95 +3965,58 @@
                 <a:uFillTx/>
                 <a:latin typeface="Source Sans Pro Light"/>
               </a:rPr>
-              <a:t>interesti</a:t>
-            </a:r>
-            <a:r>
-              <a:rPr b="0" lang="en-US" sz="2200" spc="-1" strike="noStrike" u="sng">
-                <a:solidFill>
-                  <a:srgbClr val="1c1c1c"/>
-                </a:solidFill>
-                <a:uFillTx/>
+              <a:t>interesting</a:t>
+            </a:r>
+            <a:r>
+              <a:rPr b="0" lang="en-US" sz="2200" spc="-1" strike="noStrike">
+                <a:solidFill>
+                  <a:srgbClr val="1c1c1c"/>
+                </a:solidFill>
                 <a:latin typeface="Source Sans Pro Light"/>
               </a:rPr>
-              <a:t>ng</a:t>
-            </a:r>
-            <a:r>
-              <a:rPr b="0" lang="en-US" sz="2200" spc="-1" strike="noStrike">
+              <a:t> code challenge.</a:t>
+            </a:r>
+            <a:endParaRPr b="0" lang="en-US" sz="2200" spc="-1" strike="noStrike">
+              <a:solidFill>
+                <a:srgbClr val="1c1c1c"/>
+              </a:solidFill>
+              <a:latin typeface="Source Sans Pro Light"/>
+            </a:endParaRPr>
+          </a:p>
+          <a:p>
+            <a:endParaRPr b="0" lang="en-US" sz="2200" spc="-1" strike="noStrike">
+              <a:solidFill>
+                <a:srgbClr val="1c1c1c"/>
+              </a:solidFill>
+              <a:latin typeface="Source Sans Pro Light"/>
+            </a:endParaRPr>
+          </a:p>
+          <a:p>
+            <a:r>
+              <a:rPr b="1" lang="en-US" sz="1600" spc="-1" strike="noStrike">
                 <a:solidFill>
                   <a:srgbClr val="1c1c1c"/>
                 </a:solidFill>
                 <a:latin typeface="Source Sans Pro Light"/>
               </a:rPr>
-              <a:t> code </a:t>
-            </a:r>
-            <a:r>
-              <a:rPr b="0" lang="en-US" sz="2200" spc="-1" strike="noStrike">
+              <a:t>Kiffin Gish</a:t>
+            </a:r>
+            <a:endParaRPr b="0" lang="en-US" sz="1600" spc="-1" strike="noStrike">
+              <a:solidFill>
+                <a:srgbClr val="1c1c1c"/>
+              </a:solidFill>
+              <a:latin typeface="Source Sans Pro Light"/>
+            </a:endParaRPr>
+          </a:p>
+          <a:p>
+            <a:r>
+              <a:rPr b="0" lang="en-US" sz="1600" spc="-1" strike="noStrike">
                 <a:solidFill>
                   <a:srgbClr val="1c1c1c"/>
                 </a:solidFill>
                 <a:latin typeface="Source Sans Pro Light"/>
               </a:rPr>
-              <a:t>challen</a:t>
-            </a:r>
-            <a:r>
-              <a:rPr b="0" lang="en-US" sz="2200" spc="-1" strike="noStrike">
-                <a:solidFill>
-                  <a:srgbClr val="1c1c1c"/>
-                </a:solidFill>
-                <a:latin typeface="Source Sans Pro Light"/>
-              </a:rPr>
-              <a:t>ge.</a:t>
-            </a:r>
-            <a:endParaRPr b="0" lang="en-US" sz="2200" spc="-1" strike="noStrike">
-              <a:solidFill>
-                <a:srgbClr val="1c1c1c"/>
-              </a:solidFill>
-              <a:latin typeface="Source Sans Pro Light"/>
-            </a:endParaRPr>
-          </a:p>
-          <a:p>
-            <a:endParaRPr b="0" lang="en-US" sz="2200" spc="-1" strike="noStrike">
-              <a:solidFill>
-                <a:srgbClr val="1c1c1c"/>
-              </a:solidFill>
-              <a:latin typeface="Source Sans Pro Light"/>
-            </a:endParaRPr>
-          </a:p>
-          <a:p>
-            <a:r>
-              <a:rPr b="1" lang="en-US" sz="1600" spc="-1" strike="noStrike">
-                <a:solidFill>
-                  <a:srgbClr val="1c1c1c"/>
-                </a:solidFill>
-                <a:latin typeface="Source Sans Pro Light"/>
-              </a:rPr>
-              <a:t>Kiffin Gish</a:t>
-            </a:r>
-            <a:endParaRPr b="0" lang="en-US" sz="1600" spc="-1" strike="noStrike">
-              <a:solidFill>
-                <a:srgbClr val="1c1c1c"/>
-              </a:solidFill>
-              <a:latin typeface="Source Sans Pro Light"/>
-            </a:endParaRPr>
-          </a:p>
-          <a:p>
-            <a:r>
-              <a:rPr b="0" lang="en-US" sz="1600" spc="-1" strike="noStrike">
-                <a:solidFill>
-                  <a:srgbClr val="1c1c1c"/>
-                </a:solidFill>
-                <a:latin typeface="Source Sans Pro Light"/>
-              </a:rPr>
-              <a:t>November </a:t>
-            </a:r>
-            <a:r>
-              <a:rPr b="0" lang="en-US" sz="1600" spc="-1" strike="noStrike">
-                <a:solidFill>
-                  <a:srgbClr val="1c1c1c"/>
-                </a:solidFill>
-                <a:latin typeface="Source Sans Pro Light"/>
-              </a:rPr>
-              <a:t>28, 2019</a:t>
+              <a:t>November 28, 2019</a:t>
             </a:r>
             <a:endParaRPr b="0" lang="en-US" sz="1600" spc="-1" strike="noStrike">
               <a:solidFill>
@@ -4285,7 +4266,7 @@
                 </a:solidFill>
                 <a:latin typeface="Source Sans Pro Semibold"/>
               </a:rPr>
-              <a:t> to throttle API calls.</a:t>
+              <a:t> to throttle the API requests.</a:t>
             </a:r>
             <a:endParaRPr b="1" lang="en-US" sz="2600" spc="-1" strike="noStrike">
               <a:solidFill>
@@ -4345,7 +4326,7 @@
                 </a:solidFill>
                 <a:latin typeface="Source Sans Pro Semibold"/>
               </a:rPr>
-              <a:t> data set results for recurring calls.</a:t>
+              <a:t> the data set results for recurring API requests.</a:t>
             </a:r>
             <a:endParaRPr b="1" lang="en-US" sz="2600" spc="-1" strike="noStrike">
               <a:solidFill>
@@ -4405,7 +4386,7 @@
                 </a:solidFill>
                 <a:latin typeface="Source Sans Pro Semibold"/>
               </a:rPr>
-              <a:t> date ranges into common blocks (days).</a:t>
+              <a:t> the date ranges into common blocks (days).</a:t>
             </a:r>
             <a:endParaRPr b="1" lang="en-US" sz="2600" spc="-1" strike="noStrike">
               <a:solidFill>
@@ -4534,7 +4515,7 @@
                 </a:solidFill>
                 <a:latin typeface="Source Sans Pro Semibold"/>
               </a:rPr>
-              <a:t> with the data set using date ranges, filters, sorting, etc.</a:t>
+              <a:t> with the data set: date ranges, filters, sorting, etc.</a:t>
             </a:r>
             <a:endParaRPr b="1" lang="en-US" sz="2600" spc="-1" strike="noStrike">
               <a:solidFill>
@@ -4738,7 +4719,7 @@
                 </a:solidFill>
                 <a:latin typeface="Source Sans Pro Black"/>
               </a:rPr>
-              <a:t>Code walkthrough</a:t>
+              <a:t>Code walk-through</a:t>
             </a:r>
             <a:endParaRPr b="1" lang="en-US" sz="3200" spc="-1" strike="noStrike">
               <a:solidFill>
@@ -4976,7 +4957,7 @@
                 </a:solidFill>
                 <a:latin typeface="Source Sans Pro Black"/>
               </a:rPr>
-              <a:t>Todo (rainy day)</a:t>
+              <a:t>To do (rainy day)</a:t>
             </a:r>
             <a:endParaRPr b="1" lang="en-US" sz="3200" spc="-1" strike="noStrike">
               <a:solidFill>
@@ -5045,25 +5026,7 @@
                 </a:solidFill>
                 <a:latin typeface="Source Sans Pro Semibold"/>
               </a:rPr>
-              <a:t> to </a:t>
-            </a:r>
-            <a:r>
-              <a:rPr b="1" lang="en-US" sz="2600" spc="-1" strike="noStrike">
-                <a:solidFill>
-                  <a:srgbClr val="1c1c1c"/>
-                </a:solidFill>
-                <a:latin typeface="Source Sans Pro Semibold"/>
-              </a:rPr>
-              <a:t>compress data </a:t>
-            </a:r>
-            <a:r>
-              <a:rPr b="1" lang="en-US" sz="2600" spc="-1" strike="noStrike">
-                <a:solidFill>
-                  <a:srgbClr val="1c1c1c"/>
-                </a:solidFill>
-                <a:latin typeface="Source Sans Pro Semibold"/>
-              </a:rPr>
-              <a:t>exchange.</a:t>
+              <a:t> to compress data exchange.</a:t>
             </a:r>
             <a:endParaRPr b="1" lang="en-US" sz="2600" spc="-1" strike="noStrike">
               <a:solidFill>
@@ -5113,7 +5076,7 @@
                 </a:solidFill>
                 <a:latin typeface="Source Sans Pro Semibold"/>
               </a:rPr>
-              <a:t>Fancier </a:t>
+              <a:t>Create fancier </a:t>
             </a:r>
             <a:r>
               <a:rPr b="1" lang="en-US" sz="2600" spc="-1" strike="noStrike" u="sng">
@@ -5211,25 +5174,7 @@
                 </a:solidFill>
                 <a:latin typeface="Source Sans Pro Semibold"/>
               </a:rPr>
-              <a:t> </a:t>
-            </a:r>
-            <a:r>
-              <a:rPr b="1" lang="en-US" sz="2600" spc="-1" strike="noStrike">
-                <a:solidFill>
-                  <a:srgbClr val="1c1c1c"/>
-                </a:solidFill>
-                <a:latin typeface="Source Sans Pro Semibold"/>
-              </a:rPr>
-              <a:t>and tweak the code </a:t>
-            </a:r>
-            <a:r>
-              <a:rPr b="1" lang="en-US" sz="2600" spc="-1" strike="noStrike">
-                <a:solidFill>
-                  <a:srgbClr val="1c1c1c"/>
-                </a:solidFill>
-                <a:latin typeface="Source Sans Pro Semibold"/>
-              </a:rPr>
-              <a:t>accordingly.</a:t>
+              <a:t> and tweak the code accordingly.</a:t>
             </a:r>
             <a:endParaRPr b="1" lang="en-US" sz="2600" spc="-1" strike="noStrike">
               <a:solidFill>
@@ -5298,16 +5243,7 @@
                 </a:solidFill>
                 <a:latin typeface="Source Sans Pro Semibold"/>
               </a:rPr>
-              <a:t> </a:t>
-            </a:r>
-            <a:r>
-              <a:rPr b="1" lang="en-US" sz="2600" spc="-1" strike="noStrike">
-                <a:solidFill>
-                  <a:srgbClr val="1c1c1c"/>
-                </a:solidFill>
-                <a:latin typeface="Source Sans Pro Semibold"/>
-              </a:rPr>
-              <a:t>configuration options.</a:t>
+              <a:t> configuration options.</a:t>
             </a:r>
             <a:endParaRPr b="1" lang="en-US" sz="2600" spc="-1" strike="noStrike">
               <a:solidFill>
@@ -5376,16 +5312,7 @@
                 </a:solidFill>
                 <a:latin typeface="Source Sans Pro Semibold"/>
               </a:rPr>
-              <a:t> </a:t>
-            </a:r>
-            <a:r>
-              <a:rPr b="1" lang="en-US" sz="2600" spc="-1" strike="noStrike">
-                <a:solidFill>
-                  <a:srgbClr val="1c1c1c"/>
-                </a:solidFill>
-                <a:latin typeface="Source Sans Pro Semibold"/>
-              </a:rPr>
-              <a:t>configuration options.</a:t>
+              <a:t> configuration options.</a:t>
             </a:r>
             <a:endParaRPr b="1" lang="en-US" sz="2600" spc="-1" strike="noStrike">
               <a:solidFill>
@@ -5445,16 +5372,7 @@
                 </a:solidFill>
                 <a:latin typeface="Source Sans Pro Semibold"/>
               </a:rPr>
-              <a:t>, </a:t>
-            </a:r>
-            <a:r>
-              <a:rPr b="1" lang="en-US" sz="2600" spc="-1" strike="noStrike">
-                <a:solidFill>
-                  <a:srgbClr val="1c1c1c"/>
-                </a:solidFill>
-                <a:latin typeface="Source Sans Pro Semibold"/>
-              </a:rPr>
-              <a:t>hours or minutes.</a:t>
+              <a:t>, hours or minutes or even dynamic.</a:t>
             </a:r>
             <a:endParaRPr b="1" lang="en-US" sz="2600" spc="-1" strike="noStrike">
               <a:solidFill>
@@ -5504,7 +5422,7 @@
                 </a:solidFill>
                 <a:latin typeface="Source Sans Pro Semibold"/>
               </a:rPr>
-              <a:t>Separate </a:t>
+              <a:t>Offload to a separate </a:t>
             </a:r>
             <a:r>
               <a:rPr b="1" lang="en-US" sz="2600" spc="-1" strike="noStrike" u="sng">
@@ -5523,16 +5441,7 @@
                 </a:solidFill>
                 <a:latin typeface="Source Sans Pro Semibold"/>
               </a:rPr>
-              <a:t> </a:t>
-            </a:r>
-            <a:r>
-              <a:rPr b="1" lang="en-US" sz="2600" spc="-1" strike="noStrike">
-                <a:solidFill>
-                  <a:srgbClr val="1c1c1c"/>
-                </a:solidFill>
-                <a:latin typeface="Source Sans Pro Semibold"/>
-              </a:rPr>
-              <a:t>for Redis caching.</a:t>
+              <a:t> for Redis caching.</a:t>
             </a:r>
             <a:endParaRPr b="1" lang="en-US" sz="2600" spc="-1" strike="noStrike">
               <a:solidFill>
@@ -5592,16 +5501,7 @@
                 </a:solidFill>
                 <a:latin typeface="Source Sans Pro Semibold"/>
               </a:rPr>
-              <a:t> time mean </a:t>
-            </a:r>
-            <a:r>
-              <a:rPr b="1" lang="en-US" sz="2600" spc="-1" strike="noStrike">
-                <a:solidFill>
-                  <a:srgbClr val="1c1c1c"/>
-                </a:solidFill>
-                <a:latin typeface="Source Sans Pro Semibold"/>
-              </a:rPr>
-              <a:t>sequences.</a:t>
+              <a:t> time mean sequences: seconds, minutes, hours and days.</a:t>
             </a:r>
             <a:endParaRPr b="1" lang="en-US" sz="2600" spc="-1" strike="noStrike">
               <a:solidFill>
@@ -5877,25 +5777,7 @@
                 </a:solidFill>
                 <a:latin typeface="Source Sans Pro Black"/>
               </a:rPr>
-              <a:t>Intro</a:t>
-            </a:r>
-            <a:r>
-              <a:rPr b="1" lang="en-US" sz="3200" spc="-1" strike="noStrike">
-                <a:solidFill>
-                  <a:srgbClr val="ffffff"/>
-                </a:solidFill>
-                <a:latin typeface="Source Sans Pro Black"/>
-              </a:rPr>
-              <a:t>ducti</a:t>
-            </a:r>
-            <a:r>
-              <a:rPr b="1" lang="en-US" sz="3200" spc="-1" strike="noStrike">
-                <a:solidFill>
-                  <a:srgbClr val="ffffff"/>
-                </a:solidFill>
-                <a:latin typeface="Source Sans Pro Black"/>
-              </a:rPr>
-              <a:t>on</a:t>
+              <a:t>Introduction</a:t>
             </a:r>
             <a:endParaRPr b="1" lang="en-US" sz="3200" spc="-1" strike="noStrike">
               <a:solidFill>
@@ -6057,25 +5939,7 @@
                 </a:solidFill>
                 <a:latin typeface="Source Sans Pro Black"/>
               </a:rPr>
-              <a:t>Repo</a:t>
-            </a:r>
-            <a:r>
-              <a:rPr b="1" lang="en-US" sz="3200" spc="-1" strike="noStrike">
-                <a:solidFill>
-                  <a:srgbClr val="ffffff"/>
-                </a:solidFill>
-                <a:latin typeface="Source Sans Pro Black"/>
-              </a:rPr>
-              <a:t>sitor</a:t>
-            </a:r>
-            <a:r>
-              <a:rPr b="1" lang="en-US" sz="3200" spc="-1" strike="noStrike">
-                <a:solidFill>
-                  <a:srgbClr val="ffffff"/>
-                </a:solidFill>
-                <a:latin typeface="Source Sans Pro Black"/>
-              </a:rPr>
-              <a:t>y</a:t>
+              <a:t>Repository</a:t>
             </a:r>
             <a:endParaRPr b="1" lang="en-US" sz="3200" spc="-1" strike="noStrike">
               <a:solidFill>
@@ -6190,25 +6054,7 @@
                 </a:solidFill>
                 <a:latin typeface="Source Sans Pro Black"/>
               </a:rPr>
-              <a:t>Code </a:t>
-            </a:r>
-            <a:r>
-              <a:rPr b="1" lang="en-US" sz="3200" spc="-1" strike="noStrike">
-                <a:solidFill>
-                  <a:srgbClr val="ffffff"/>
-                </a:solidFill>
-                <a:latin typeface="Source Sans Pro Black"/>
-              </a:rPr>
-              <a:t>chall</a:t>
-            </a:r>
-            <a:r>
-              <a:rPr b="1" lang="en-US" sz="3200" spc="-1" strike="noStrike">
-                <a:solidFill>
-                  <a:srgbClr val="ffffff"/>
-                </a:solidFill>
-                <a:latin typeface="Source Sans Pro Black"/>
-              </a:rPr>
-              <a:t>enge</a:t>
+              <a:t>Code challenge</a:t>
             </a:r>
             <a:endParaRPr b="1" lang="en-US" sz="3200" spc="-1" strike="noStrike">
               <a:solidFill>
@@ -6327,7 +6173,7 @@
                 </a:solidFill>
                 <a:latin typeface="Source Sans Pro Semibold"/>
               </a:rPr>
-              <a:t>For a given vehicle and range of dates, returns a </a:t>
+              <a:t>For a given vehicle and range of dates, return a </a:t>
             </a:r>
             <a:r>
               <a:rPr b="1" lang="en-US" sz="2600" spc="-1" strike="noStrike" u="sng">
@@ -6396,7 +6242,7 @@
                 </a:solidFill>
                 <a:latin typeface="Source Sans Pro Semibold"/>
               </a:rPr>
-              <a:t>Build </a:t>
+              <a:t>Must </a:t>
             </a:r>
             <a:r>
               <a:rPr b="1" lang="en-US" sz="2600" spc="-1" strike="noStrike" u="sng">
@@ -6406,35 +6252,16 @@
                 <a:uFillTx/>
                 <a:latin typeface="Source Sans Pro Semibold"/>
               </a:rPr>
-              <a:t>front-end</a:t>
-            </a:r>
-            <a:r>
-              <a:rPr b="1" lang="en-US" sz="2600" spc="-1" strike="noStrike">
-                <a:solidFill>
-                  <a:srgbClr val="1c1c1c"/>
-                </a:solidFill>
-                <a:latin typeface="Source Sans Pro Semibold"/>
-              </a:rPr>
-              <a:t> that accesses a robust </a:t>
-            </a:r>
-            <a:r>
-              <a:rPr b="1" lang="en-US" sz="2600" spc="-1" strike="noStrike" u="sng">
-                <a:solidFill>
-                  <a:srgbClr val="1c1c1c"/>
-                </a:solidFill>
-                <a:uFillTx/>
-                <a:latin typeface="Source Sans Pro Semibold"/>
-              </a:rPr>
-              <a:t>back-end</a:t>
-            </a:r>
-            <a:r>
-              <a:rPr b="1" lang="en-US" sz="2600" spc="-1" strike="noStrike">
-                <a:solidFill>
-                  <a:srgbClr val="1c1c1c"/>
-                </a:solidFill>
-                <a:latin typeface="Source Sans Pro Semibold"/>
-              </a:rPr>
-              <a:t>.</a:t>
+              <a:t>NOT</a:t>
+            </a:r>
+            <a:r>
+              <a:rPr b="1" lang="en-US" sz="2600" spc="-1" strike="noStrike">
+                <a:solidFill>
+                  <a:srgbClr val="1c1c1c"/>
+                </a:solidFill>
+                <a:latin typeface="Source Sans Pro Semibold"/>
+              </a:rPr>
+              <a:t> overflow the database system when a lot of export requests are issued.</a:t>
             </a:r>
             <a:endParaRPr b="1" lang="en-US" sz="2600" spc="-1" strike="noStrike">
               <a:solidFill>
@@ -6484,7 +6311,7 @@
                 </a:solidFill>
                 <a:latin typeface="Source Sans Pro Semibold"/>
               </a:rPr>
-              <a:t>Must </a:t>
+              <a:t>(Optional) Build a </a:t>
             </a:r>
             <a:r>
               <a:rPr b="1" lang="en-US" sz="2600" spc="-1" strike="noStrike" u="sng">
@@ -6494,17 +6321,52 @@
                 <a:uFillTx/>
                 <a:latin typeface="Source Sans Pro Semibold"/>
               </a:rPr>
-              <a:t>NOT</a:t>
-            </a:r>
-            <a:r>
-              <a:rPr b="1" lang="en-US" sz="2600" spc="-1" strike="noStrike">
-                <a:solidFill>
-                  <a:srgbClr val="1c1c1c"/>
-                </a:solidFill>
-                <a:latin typeface="Source Sans Pro Semibold"/>
-              </a:rPr>
-              <a:t> overflow the database system when a lot of export requests are issued.</a:t>
-            </a:r>
+              <a:t>front-end</a:t>
+            </a:r>
+            <a:r>
+              <a:rPr b="1" lang="en-US" sz="2600" spc="-1" strike="noStrike">
+                <a:solidFill>
+                  <a:srgbClr val="1c1c1c"/>
+                </a:solidFill>
+                <a:latin typeface="Source Sans Pro Semibold"/>
+              </a:rPr>
+              <a:t> that accesses a robust </a:t>
+            </a:r>
+            <a:r>
+              <a:rPr b="1" lang="en-US" sz="2600" spc="-1" strike="noStrike" u="sng">
+                <a:solidFill>
+                  <a:srgbClr val="1c1c1c"/>
+                </a:solidFill>
+                <a:uFillTx/>
+                <a:latin typeface="Source Sans Pro Semibold"/>
+              </a:rPr>
+              <a:t>back-end</a:t>
+            </a:r>
+            <a:r>
+              <a:rPr b="1" lang="en-US" sz="2600" spc="-1" strike="noStrike">
+                <a:solidFill>
+                  <a:srgbClr val="1c1c1c"/>
+                </a:solidFill>
+                <a:latin typeface="Source Sans Pro Semibold"/>
+              </a:rPr>
+              <a:t>.</a:t>
+            </a:r>
+            <a:endParaRPr b="1" lang="en-US" sz="2600" spc="-1" strike="noStrike">
+              <a:solidFill>
+                <a:srgbClr val="1c1c1c"/>
+              </a:solidFill>
+              <a:latin typeface="Source Sans Pro Semibold"/>
+            </a:endParaRPr>
+          </a:p>
+          <a:p>
+            <a:pPr>
+              <a:lnSpc>
+                <a:spcPct val="100000"/>
+              </a:lnSpc>
+              <a:spcAft>
+                <a:spcPts val="1142"/>
+              </a:spcAft>
+            </a:pPr>
             <a:endParaRPr b="1" lang="en-US" sz="2600" spc="-1" strike="noStrike">
               <a:solidFill>
                 <a:srgbClr val="1c1c1c"/>
@@ -6592,34 +6454,7 @@
                 </a:solidFill>
                 <a:latin typeface="Source Sans Pro Black"/>
               </a:rPr>
-              <a:t>Plan </a:t>
-            </a:r>
-            <a:r>
-              <a:rPr b="1" lang="en-US" sz="3200" spc="-1" strike="noStrike">
-                <a:solidFill>
-                  <a:srgbClr val="ffffff"/>
-                </a:solidFill>
-                <a:latin typeface="Source Sans Pro Black"/>
-              </a:rPr>
-              <a:t>of </a:t>
-            </a:r>
-            <a:r>
-              <a:rPr b="1" lang="en-US" sz="3200" spc="-1" strike="noStrike">
-                <a:solidFill>
-                  <a:srgbClr val="ffffff"/>
-                </a:solidFill>
-                <a:latin typeface="Source Sans Pro Black"/>
-              </a:rPr>
-              <a:t>attac</a:t>
-            </a:r>
-            <a:r>
-              <a:rPr b="1" lang="en-US" sz="3200" spc="-1" strike="noStrike">
-                <a:solidFill>
-                  <a:srgbClr val="ffffff"/>
-                </a:solidFill>
-                <a:latin typeface="Source Sans Pro Black"/>
-              </a:rPr>
-              <a:t>k 1/2</a:t>
+              <a:t>Plan of attack 1/2</a:t>
             </a:r>
             <a:endParaRPr b="1" lang="en-US" sz="3200" spc="-1" strike="noStrike">
               <a:solidFill>
@@ -7210,25 +7045,7 @@
                 </a:solidFill>
                 <a:latin typeface="Source Sans Pro Black"/>
               </a:rPr>
-              <a:t>Plan of </a:t>
-            </a:r>
-            <a:r>
-              <a:rPr b="1" lang="en-US" sz="3200" spc="-1" strike="noStrike">
-                <a:solidFill>
-                  <a:srgbClr val="ffffff"/>
-                </a:solidFill>
-                <a:latin typeface="Source Sans Pro Black"/>
-              </a:rPr>
-              <a:t>attack </a:t>
-            </a:r>
-            <a:r>
-              <a:rPr b="1" lang="en-US" sz="3200" spc="-1" strike="noStrike">
-                <a:solidFill>
-                  <a:srgbClr val="ffffff"/>
-                </a:solidFill>
-                <a:latin typeface="Source Sans Pro Black"/>
-              </a:rPr>
-              <a:t>2/2</a:t>
+              <a:t>Plan of attack 2/2</a:t>
             </a:r>
             <a:endParaRPr b="1" lang="en-US" sz="3200" spc="-1" strike="noStrike">
               <a:solidFill>
@@ -7791,43 +7608,7 @@
                 </a:solidFill>
                 <a:latin typeface="Source Sans Pro Black"/>
               </a:rPr>
-              <a:t>Som</a:t>
-            </a:r>
-            <a:r>
-              <a:rPr b="1" lang="en-US" sz="3200" spc="-1" strike="noStrike">
-                <a:solidFill>
-                  <a:srgbClr val="ffffff"/>
-                </a:solidFill>
-                <a:latin typeface="Source Sans Pro Black"/>
-              </a:rPr>
-              <a:t>e </a:t>
-            </a:r>
-            <a:r>
-              <a:rPr b="1" lang="en-US" sz="3200" spc="-1" strike="noStrike">
-                <a:solidFill>
-                  <a:srgbClr val="ffffff"/>
-                </a:solidFill>
-                <a:latin typeface="Source Sans Pro Black"/>
-              </a:rPr>
-              <a:t>pre-</a:t>
-            </a:r>
-            <a:r>
-              <a:rPr b="1" lang="en-US" sz="3200" spc="-1" strike="noStrike">
-                <a:solidFill>
-                  <a:srgbClr val="ffffff"/>
-                </a:solidFill>
-                <a:latin typeface="Source Sans Pro Black"/>
-              </a:rPr>
-              <a:t>requi</a:t>
-            </a:r>
-            <a:r>
-              <a:rPr b="1" lang="en-US" sz="3200" spc="-1" strike="noStrike">
-                <a:solidFill>
-                  <a:srgbClr val="ffffff"/>
-                </a:solidFill>
-                <a:latin typeface="Source Sans Pro Black"/>
-              </a:rPr>
-              <a:t>sites</a:t>
+              <a:t>Open source</a:t>
             </a:r>
             <a:endParaRPr b="1" lang="en-US" sz="3200" spc="-1" strike="noStrike">
               <a:solidFill>
@@ -8262,34 +8043,7 @@
                 </a:solidFill>
                 <a:latin typeface="Source Sans Pro Black"/>
               </a:rPr>
-              <a:t>Some </a:t>
-            </a:r>
-            <a:r>
-              <a:rPr b="1" lang="en-US" sz="3200" spc="-1" strike="noStrike">
-                <a:solidFill>
-                  <a:srgbClr val="ffffff"/>
-                </a:solidFill>
-                <a:latin typeface="Source Sans Pro Black"/>
-              </a:rPr>
-              <a:t>pre-</a:t>
-            </a:r>
-            <a:r>
-              <a:rPr b="1" lang="en-US" sz="3200" spc="-1" strike="noStrike">
-                <a:solidFill>
-                  <a:srgbClr val="ffffff"/>
-                </a:solidFill>
-                <a:latin typeface="Source Sans Pro Black"/>
-              </a:rPr>
-              <a:t>requisit</a:t>
-            </a:r>
-            <a:r>
-              <a:rPr b="1" lang="en-US" sz="3200" spc="-1" strike="noStrike">
-                <a:solidFill>
-                  <a:srgbClr val="ffffff"/>
-                </a:solidFill>
-                <a:latin typeface="Source Sans Pro Black"/>
-              </a:rPr>
-              <a:t>es</a:t>
+              <a:t>Open source</a:t>
             </a:r>
             <a:endParaRPr b="1" lang="en-US" sz="3200" spc="-1" strike="noStrike">
               <a:solidFill>
@@ -8705,7 +8459,7 @@
               </a:rPr>
               <a:t>ANGULAR</a:t>
             </a:r>
-            <a:endParaRPr b="1" lang="en-US" sz="2200" spc="-1" strike="noStrike">
+            <a:endParaRPr b="0" lang="en-US" sz="2200" spc="-1" strike="noStrike">
               <a:latin typeface="Source Sans Pro"/>
             </a:endParaRPr>
           </a:p>
@@ -8740,7 +8494,7 @@
               </a:rPr>
               <a:t>JEST</a:t>
             </a:r>
-            <a:endParaRPr b="1" lang="en-US" sz="2200" spc="-1" strike="noStrike">
+            <a:endParaRPr b="0" lang="en-US" sz="2200" spc="-1" strike="noStrike">
               <a:latin typeface="Source Sans Pro"/>
             </a:endParaRPr>
           </a:p>
@@ -8775,7 +8529,7 @@
               </a:rPr>
               <a:t>REDIS</a:t>
             </a:r>
-            <a:endParaRPr b="1" lang="en-US" sz="2200" spc="-1" strike="noStrike">
+            <a:endParaRPr b="0" lang="en-US" sz="2200" spc="-1" strike="noStrike">
               <a:latin typeface="Source Sans Pro"/>
             </a:endParaRPr>
           </a:p>
@@ -8810,7 +8564,7 @@
               </a:rPr>
               <a:t>NESTJS</a:t>
             </a:r>
-            <a:endParaRPr b="1" lang="en-US" sz="2200" spc="-1" strike="noStrike">
+            <a:endParaRPr b="0" lang="en-US" sz="2200" spc="-1" strike="noStrike">
               <a:latin typeface="Source Sans Pro"/>
             </a:endParaRPr>
           </a:p>
@@ -8845,7 +8599,7 @@
               </a:rPr>
               <a:t>COCA-COLA</a:t>
             </a:r>
-            <a:endParaRPr b="1" lang="en-US" sz="2200" spc="-1" strike="noStrike">
+            <a:endParaRPr b="0" lang="en-US" sz="2200" spc="-1" strike="noStrike">
               <a:latin typeface="Source Sans Pro"/>
             </a:endParaRPr>
           </a:p>
@@ -8880,7 +8634,7 @@
               </a:rPr>
               <a:t>MONGODB</a:t>
             </a:r>
-            <a:endParaRPr b="1" lang="en-US" sz="2200" spc="-1" strike="noStrike">
+            <a:endParaRPr b="0" lang="en-US" sz="2200" spc="-1" strike="noStrike">
               <a:latin typeface="Source Sans Pro"/>
             </a:endParaRPr>
           </a:p>
@@ -8915,7 +8669,7 @@
               </a:rPr>
               <a:t>GIT</a:t>
             </a:r>
-            <a:endParaRPr b="1" lang="en-US" sz="2200" spc="-1" strike="noStrike">
+            <a:endParaRPr b="0" lang="en-US" sz="2200" spc="-1" strike="noStrike">
               <a:latin typeface="Source Sans Pro"/>
             </a:endParaRPr>
           </a:p>
@@ -8950,7 +8704,7 @@
               </a:rPr>
               <a:t>CHARTJS</a:t>
             </a:r>
-            <a:endParaRPr b="1" lang="en-US" sz="2200" spc="-1" strike="noStrike">
+            <a:endParaRPr b="0" lang="en-US" sz="2200" spc="-1" strike="noStrike">
               <a:latin typeface="Source Sans Pro"/>
             </a:endParaRPr>
           </a:p>
@@ -8985,7 +8739,7 @@
               </a:rPr>
               <a:t>CHAI</a:t>
             </a:r>
-            <a:endParaRPr b="1" lang="en-US" sz="2200" spc="-1" strike="noStrike">
+            <a:endParaRPr b="0" lang="en-US" sz="2200" spc="-1" strike="noStrike">
               <a:latin typeface="Source Sans Pro"/>
             </a:endParaRPr>
           </a:p>
@@ -9020,7 +8774,7 @@
               </a:rPr>
               <a:t>JASMINE</a:t>
             </a:r>
-            <a:endParaRPr b="1" lang="en-US" sz="2200" spc="-1" strike="noStrike">
+            <a:endParaRPr b="0" lang="en-US" sz="2200" spc="-1" strike="noStrike">
               <a:latin typeface="Source Sans Pro"/>
             </a:endParaRPr>
           </a:p>
@@ -9055,7 +8809,7 @@
               </a:rPr>
               <a:t>D3JS</a:t>
             </a:r>
-            <a:endParaRPr b="1" lang="en-US" sz="2200" spc="-1" strike="noStrike">
+            <a:endParaRPr b="0" lang="en-US" sz="2200" spc="-1" strike="noStrike">
               <a:latin typeface="Source Sans Pro"/>
             </a:endParaRPr>
           </a:p>
@@ -9090,7 +8844,7 @@
               </a:rPr>
               <a:t>NODE</a:t>
             </a:r>
-            <a:endParaRPr b="1" lang="en-US" sz="2200" spc="-1" strike="noStrike">
+            <a:endParaRPr b="0" lang="en-US" sz="2200" spc="-1" strike="noStrike">
               <a:latin typeface="Source Sans Pro"/>
             </a:endParaRPr>
           </a:p>
@@ -9125,7 +8879,7 @@
               </a:rPr>
               <a:t>POSTGRES</a:t>
             </a:r>
-            <a:endParaRPr b="1" lang="en-US" sz="2200" spc="-1" strike="noStrike">
+            <a:endParaRPr b="0" lang="en-US" sz="2200" spc="-1" strike="noStrike">
               <a:latin typeface="Source Sans Pro"/>
             </a:endParaRPr>
           </a:p>
@@ -9160,7 +8914,7 @@
               </a:rPr>
               <a:t>MATERIAL</a:t>
             </a:r>
-            <a:endParaRPr b="1" lang="en-US" sz="2200" spc="-1" strike="noStrike">
+            <a:endParaRPr b="0" lang="en-US" sz="2200" spc="-1" strike="noStrike">
               <a:latin typeface="Source Sans Pro"/>
             </a:endParaRPr>
           </a:p>
@@ -9195,7 +8949,7 @@
               </a:rPr>
               <a:t>DOCKER</a:t>
             </a:r>
-            <a:endParaRPr b="1" lang="en-US" sz="2200" spc="-1" strike="noStrike">
+            <a:endParaRPr b="0" lang="en-US" sz="2200" spc="-1" strike="noStrike">
               <a:latin typeface="Source Sans Pro"/>
             </a:endParaRPr>
           </a:p>

</xml_diff>